<commit_message>
grr präsi für 15.12 fertig
</commit_message>
<xml_diff>
--- a/dokumentation/formelles/grr.pptx
+++ b/dokumentation/formelles/grr.pptx
@@ -9,6 +9,10 @@
   </p:notesMasterIdLst>
   <p:sldIdLst>
     <p:sldId id="256" r:id="rId4"/>
+    <p:sldId id="257" r:id="rId5"/>
+    <p:sldId id="258" r:id="rId6"/>
+    <p:sldId id="259" r:id="rId7"/>
+    <p:sldId id="260" r:id="rId8"/>
   </p:sldIdLst>
   <p:sldSz cx="9144000" cy="6858000"/>
   <p:notesSz cx="6858000" cy="9144000"/>
@@ -34,7 +38,7 @@
       </p:grpSpPr>
       <p:sp>
         <p:nvSpPr>
-          <p:cNvPr id="65" name="PlaceHolder 1"/>
+          <p:cNvPr id="66" name="PlaceHolder 1"/>
           <p:cNvSpPr>
             <a:spLocks noGrp="1"/>
           </p:cNvSpPr>
@@ -58,7 +62,181 @@
               <a:rPr b="0" lang="en-US" sz="2000" spc="-1" strike="noStrike">
                 <a:latin typeface="Arial"/>
               </a:rPr>
-              <a:t>Click to edit the notes format</a:t>
+              <a:t>C</a:t>
+            </a:r>
+            <a:r>
+              <a:rPr b="0" lang="en-US" sz="2000" spc="-1" strike="noStrike">
+                <a:latin typeface="Arial"/>
+              </a:rPr>
+              <a:t>l</a:t>
+            </a:r>
+            <a:r>
+              <a:rPr b="0" lang="en-US" sz="2000" spc="-1" strike="noStrike">
+                <a:latin typeface="Arial"/>
+              </a:rPr>
+              <a:t>i</a:t>
+            </a:r>
+            <a:r>
+              <a:rPr b="0" lang="en-US" sz="2000" spc="-1" strike="noStrike">
+                <a:latin typeface="Arial"/>
+              </a:rPr>
+              <a:t>c</a:t>
+            </a:r>
+            <a:r>
+              <a:rPr b="0" lang="en-US" sz="2000" spc="-1" strike="noStrike">
+                <a:latin typeface="Arial"/>
+              </a:rPr>
+              <a:t>k</a:t>
+            </a:r>
+            <a:r>
+              <a:rPr b="0" lang="en-US" sz="2000" spc="-1" strike="noStrike">
+                <a:latin typeface="Arial"/>
+              </a:rPr>
+              <a:t> </a:t>
+            </a:r>
+            <a:r>
+              <a:rPr b="0" lang="en-US" sz="2000" spc="-1" strike="noStrike">
+                <a:latin typeface="Arial"/>
+              </a:rPr>
+              <a:t>t</a:t>
+            </a:r>
+            <a:r>
+              <a:rPr b="0" lang="en-US" sz="2000" spc="-1" strike="noStrike">
+                <a:latin typeface="Arial"/>
+              </a:rPr>
+              <a:t>o</a:t>
+            </a:r>
+            <a:r>
+              <a:rPr b="0" lang="en-US" sz="2000" spc="-1" strike="noStrike">
+                <a:latin typeface="Arial"/>
+              </a:rPr>
+              <a:t> </a:t>
+            </a:r>
+            <a:r>
+              <a:rPr b="0" lang="en-US" sz="2000" spc="-1" strike="noStrike">
+                <a:latin typeface="Arial"/>
+              </a:rPr>
+              <a:t>e</a:t>
+            </a:r>
+            <a:r>
+              <a:rPr b="0" lang="en-US" sz="2000" spc="-1" strike="noStrike">
+                <a:latin typeface="Arial"/>
+              </a:rPr>
+              <a:t>d</a:t>
+            </a:r>
+            <a:r>
+              <a:rPr b="0" lang="en-US" sz="2000" spc="-1" strike="noStrike">
+                <a:latin typeface="Arial"/>
+              </a:rPr>
+              <a:t>i</a:t>
+            </a:r>
+            <a:r>
+              <a:rPr b="0" lang="en-US" sz="2000" spc="-1" strike="noStrike">
+                <a:latin typeface="Arial"/>
+              </a:rPr>
+              <a:t>t</a:t>
+            </a:r>
+            <a:r>
+              <a:rPr b="0" lang="en-US" sz="2000" spc="-1" strike="noStrike">
+                <a:latin typeface="Arial"/>
+              </a:rPr>
+              <a:t> </a:t>
+            </a:r>
+            <a:r>
+              <a:rPr b="0" lang="en-US" sz="2000" spc="-1" strike="noStrike">
+                <a:latin typeface="Arial"/>
+              </a:rPr>
+              <a:t>t</a:t>
+            </a:r>
+            <a:r>
+              <a:rPr b="0" lang="en-US" sz="2000" spc="-1" strike="noStrike">
+                <a:latin typeface="Arial"/>
+              </a:rPr>
+              <a:t>h</a:t>
+            </a:r>
+            <a:r>
+              <a:rPr b="0" lang="en-US" sz="2000" spc="-1" strike="noStrike">
+                <a:latin typeface="Arial"/>
+              </a:rPr>
+              <a:t>e</a:t>
+            </a:r>
+            <a:r>
+              <a:rPr b="0" lang="en-US" sz="2000" spc="-1" strike="noStrike">
+                <a:latin typeface="Arial"/>
+              </a:rPr>
+              <a:t> </a:t>
+            </a:r>
+            <a:r>
+              <a:rPr b="0" lang="en-US" sz="2000" spc="-1" strike="noStrike">
+                <a:latin typeface="Arial"/>
+              </a:rPr>
+              <a:t>n</a:t>
+            </a:r>
+            <a:r>
+              <a:rPr b="0" lang="en-US" sz="2000" spc="-1" strike="noStrike">
+                <a:latin typeface="Arial"/>
+              </a:rPr>
+              <a:t>o</a:t>
+            </a:r>
+            <a:r>
+              <a:rPr b="0" lang="en-US" sz="2000" spc="-1" strike="noStrike">
+                <a:latin typeface="Arial"/>
+              </a:rPr>
+              <a:t>t</a:t>
+            </a:r>
+            <a:r>
+              <a:rPr b="0" lang="en-US" sz="2000" spc="-1" strike="noStrike">
+                <a:latin typeface="Arial"/>
+              </a:rPr>
+              <a:t>e</a:t>
+            </a:r>
+            <a:r>
+              <a:rPr b="0" lang="en-US" sz="2000" spc="-1" strike="noStrike">
+                <a:latin typeface="Arial"/>
+              </a:rPr>
+              <a:t>s</a:t>
+            </a:r>
+            <a:r>
+              <a:rPr b="0" lang="en-US" sz="2000" spc="-1" strike="noStrike">
+                <a:latin typeface="Arial"/>
+              </a:rPr>
+              <a:t> </a:t>
+            </a:r>
+            <a:r>
+              <a:rPr b="0" lang="en-US" sz="2000" spc="-1" strike="noStrike">
+                <a:latin typeface="Arial"/>
+              </a:rPr>
+              <a:t>f</a:t>
+            </a:r>
+            <a:r>
+              <a:rPr b="0" lang="en-US" sz="2000" spc="-1" strike="noStrike">
+                <a:latin typeface="Arial"/>
+              </a:rPr>
+              <a:t>o</a:t>
+            </a:r>
+            <a:r>
+              <a:rPr b="0" lang="en-US" sz="2000" spc="-1" strike="noStrike">
+                <a:latin typeface="Arial"/>
+              </a:rPr>
+              <a:t>r</a:t>
+            </a:r>
+            <a:r>
+              <a:rPr b="0" lang="en-US" sz="2000" spc="-1" strike="noStrike">
+                <a:latin typeface="Arial"/>
+              </a:rPr>
+              <a:t>m</a:t>
+            </a:r>
+            <a:r>
+              <a:rPr b="0" lang="en-US" sz="2000" spc="-1" strike="noStrike">
+                <a:latin typeface="Arial"/>
+              </a:rPr>
+              <a:t>a</a:t>
+            </a:r>
+            <a:r>
+              <a:rPr b="0" lang="en-US" sz="2000" spc="-1" strike="noStrike">
+                <a:latin typeface="Arial"/>
+              </a:rPr>
+              <a:t>t</a:t>
             </a:r>
             <a:endParaRPr b="0" lang="en-US" sz="2000" spc="-1" strike="noStrike">
               <a:latin typeface="Arial"/>
@@ -68,7 +246,7 @@
       </p:sp>
       <p:sp>
         <p:nvSpPr>
-          <p:cNvPr id="66" name="PlaceHolder 2"/>
+          <p:cNvPr id="67" name="PlaceHolder 2"/>
           <p:cNvSpPr>
             <a:spLocks noGrp="1"/>
           </p:cNvSpPr>
@@ -92,7 +270,7 @@
               <a:rPr b="0" lang="en-US" sz="1400" spc="-1" strike="noStrike">
                 <a:latin typeface="Times New Roman"/>
               </a:rPr>
-              <a:t>&lt;header&gt;</a:t>
+              <a:t> </a:t>
             </a:r>
             <a:endParaRPr b="0" lang="en-US" sz="1400" spc="-1" strike="noStrike">
               <a:latin typeface="Times New Roman"/>
@@ -102,7 +280,7 @@
       </p:sp>
       <p:sp>
         <p:nvSpPr>
-          <p:cNvPr id="67" name="PlaceHolder 3"/>
+          <p:cNvPr id="68" name="PlaceHolder 3"/>
           <p:cNvSpPr>
             <a:spLocks noGrp="1"/>
           </p:cNvSpPr>
@@ -127,7 +305,7 @@
               <a:rPr b="0" lang="en-US" sz="1400" spc="-1" strike="noStrike">
                 <a:latin typeface="Times New Roman"/>
               </a:rPr>
-              <a:t>&lt;date/time&gt;</a:t>
+              <a:t> </a:t>
             </a:r>
             <a:endParaRPr b="0" lang="en-US" sz="1400" spc="-1" strike="noStrike">
               <a:latin typeface="Times New Roman"/>
@@ -137,7 +315,7 @@
       </p:sp>
       <p:sp>
         <p:nvSpPr>
-          <p:cNvPr id="68" name="PlaceHolder 4"/>
+          <p:cNvPr id="69" name="PlaceHolder 4"/>
           <p:cNvSpPr>
             <a:spLocks noGrp="1"/>
           </p:cNvSpPr>
@@ -161,7 +339,7 @@
               <a:rPr b="0" lang="en-US" sz="1400" spc="-1" strike="noStrike">
                 <a:latin typeface="Times New Roman"/>
               </a:rPr>
-              <a:t>&lt;footer&gt;</a:t>
+              <a:t> </a:t>
             </a:r>
             <a:endParaRPr b="0" lang="en-US" sz="1400" spc="-1" strike="noStrike">
               <a:latin typeface="Times New Roman"/>
@@ -171,7 +349,7 @@
       </p:sp>
       <p:sp>
         <p:nvSpPr>
-          <p:cNvPr id="69" name="PlaceHolder 5"/>
+          <p:cNvPr id="70" name="PlaceHolder 5"/>
           <p:cNvSpPr>
             <a:spLocks noGrp="1"/>
           </p:cNvSpPr>
@@ -192,11 +370,11 @@
           <a:bodyPr lIns="0" rIns="0" tIns="0" bIns="0" anchor="b"/>
           <a:p>
             <a:pPr algn="r"/>
-            <a:fld id="{0590AE51-4665-4F27-8025-B5CC5F2E833F}" type="slidenum">
+            <a:fld id="{66CD38A9-72BF-4E75-B5E8-B93052D55413}" type="slidenum">
               <a:rPr b="0" lang="en-US" sz="1400" spc="-1" strike="noStrike">
                 <a:latin typeface="Times New Roman"/>
               </a:rPr>
-              <a:t>&lt;number&gt;</a:t>
+              <a:t>1</a:t>
             </a:fld>
             <a:endParaRPr b="0" lang="en-US" sz="1400" spc="-1" strike="noStrike">
               <a:latin typeface="Times New Roman"/>
@@ -229,7 +407,7 @@
       </p:grpSpPr>
       <p:sp>
         <p:nvSpPr>
-          <p:cNvPr id="72" name="PlaceHolder 1"/>
+          <p:cNvPr id="77" name="PlaceHolder 1"/>
           <p:cNvSpPr>
             <a:spLocks noGrp="1"/>
           </p:cNvSpPr>
@@ -253,7 +431,229 @@
               <a:rPr b="0" lang="en-US" sz="2000" spc="-1" strike="noStrike">
                 <a:latin typeface="Arial"/>
               </a:rPr>
-              <a:t>Adaptive = Lernfähig / Anpassungsfähig</a:t>
+              <a:t>A</a:t>
+            </a:r>
+            <a:r>
+              <a:rPr b="0" lang="en-US" sz="2000" spc="-1" strike="noStrike">
+                <a:latin typeface="Arial"/>
+              </a:rPr>
+              <a:t>d</a:t>
+            </a:r>
+            <a:r>
+              <a:rPr b="0" lang="en-US" sz="2000" spc="-1" strike="noStrike">
+                <a:latin typeface="Arial"/>
+              </a:rPr>
+              <a:t>a</a:t>
+            </a:r>
+            <a:r>
+              <a:rPr b="0" lang="en-US" sz="2000" spc="-1" strike="noStrike">
+                <a:latin typeface="Arial"/>
+              </a:rPr>
+              <a:t>p</a:t>
+            </a:r>
+            <a:r>
+              <a:rPr b="0" lang="en-US" sz="2000" spc="-1" strike="noStrike">
+                <a:latin typeface="Arial"/>
+              </a:rPr>
+              <a:t>t</a:t>
+            </a:r>
+            <a:r>
+              <a:rPr b="0" lang="en-US" sz="2000" spc="-1" strike="noStrike">
+                <a:latin typeface="Arial"/>
+              </a:rPr>
+              <a:t>i</a:t>
+            </a:r>
+            <a:r>
+              <a:rPr b="0" lang="en-US" sz="2000" spc="-1" strike="noStrike">
+                <a:latin typeface="Arial"/>
+              </a:rPr>
+              <a:t>v</a:t>
+            </a:r>
+            <a:r>
+              <a:rPr b="0" lang="en-US" sz="2000" spc="-1" strike="noStrike">
+                <a:latin typeface="Arial"/>
+              </a:rPr>
+              <a:t>e</a:t>
+            </a:r>
+            <a:r>
+              <a:rPr b="0" lang="en-US" sz="2000" spc="-1" strike="noStrike">
+                <a:latin typeface="Arial"/>
+              </a:rPr>
+              <a:t> </a:t>
+            </a:r>
+            <a:r>
+              <a:rPr b="0" lang="en-US" sz="2000" spc="-1" strike="noStrike">
+                <a:latin typeface="Arial"/>
+              </a:rPr>
+              <a:t>=</a:t>
+            </a:r>
+            <a:r>
+              <a:rPr b="0" lang="en-US" sz="2000" spc="-1" strike="noStrike">
+                <a:latin typeface="Arial"/>
+              </a:rPr>
+              <a:t> </a:t>
+            </a:r>
+            <a:r>
+              <a:rPr b="0" lang="en-US" sz="2000" spc="-1" strike="noStrike">
+                <a:latin typeface="Arial"/>
+              </a:rPr>
+              <a:t>L</a:t>
+            </a:r>
+            <a:r>
+              <a:rPr b="0" lang="en-US" sz="2000" spc="-1" strike="noStrike">
+                <a:latin typeface="Arial"/>
+              </a:rPr>
+              <a:t>e</a:t>
+            </a:r>
+            <a:r>
+              <a:rPr b="0" lang="en-US" sz="2000" spc="-1" strike="noStrike">
+                <a:latin typeface="Arial"/>
+              </a:rPr>
+              <a:t>r</a:t>
+            </a:r>
+            <a:r>
+              <a:rPr b="0" lang="en-US" sz="2000" spc="-1" strike="noStrike">
+                <a:latin typeface="Arial"/>
+              </a:rPr>
+              <a:t>n</a:t>
+            </a:r>
+            <a:r>
+              <a:rPr b="0" lang="en-US" sz="2000" spc="-1" strike="noStrike">
+                <a:latin typeface="Arial"/>
+              </a:rPr>
+              <a:t>f</a:t>
+            </a:r>
+            <a:r>
+              <a:rPr b="0" lang="en-US" sz="2000" spc="-1" strike="noStrike">
+                <a:latin typeface="Arial"/>
+              </a:rPr>
+              <a:t>ä</a:t>
+            </a:r>
+            <a:r>
+              <a:rPr b="0" lang="en-US" sz="2000" spc="-1" strike="noStrike">
+                <a:latin typeface="Arial"/>
+              </a:rPr>
+              <a:t>h</a:t>
+            </a:r>
+            <a:r>
+              <a:rPr b="0" lang="en-US" sz="2000" spc="-1" strike="noStrike">
+                <a:latin typeface="Arial"/>
+              </a:rPr>
+              <a:t>i</a:t>
+            </a:r>
+            <a:r>
+              <a:rPr b="0" lang="en-US" sz="2000" spc="-1" strike="noStrike">
+                <a:latin typeface="Arial"/>
+              </a:rPr>
+              <a:t>g</a:t>
+            </a:r>
+            <a:r>
+              <a:rPr b="0" lang="en-US" sz="2000" spc="-1" strike="noStrike">
+                <a:latin typeface="Arial"/>
+              </a:rPr>
+              <a:t> </a:t>
+            </a:r>
+            <a:r>
+              <a:rPr b="0" lang="en-US" sz="2000" spc="-1" strike="noStrike">
+                <a:latin typeface="Arial"/>
+              </a:rPr>
+              <a:t>/</a:t>
+            </a:r>
+            <a:r>
+              <a:rPr b="0" lang="en-US" sz="2000" spc="-1" strike="noStrike">
+                <a:latin typeface="Arial"/>
+              </a:rPr>
+              <a:t> </a:t>
+            </a:r>
+            <a:r>
+              <a:rPr b="0" lang="en-US" sz="2000" spc="-1" strike="noStrike">
+                <a:latin typeface="Arial"/>
+              </a:rPr>
+              <a:t>A</a:t>
+            </a:r>
+            <a:r>
+              <a:rPr b="0" lang="en-US" sz="2000" spc="-1" strike="noStrike">
+                <a:latin typeface="Arial"/>
+              </a:rPr>
+              <a:t>n</a:t>
+            </a:r>
+            <a:r>
+              <a:rPr b="0" lang="en-US" sz="2000" spc="-1" strike="noStrike">
+                <a:latin typeface="Arial"/>
+              </a:rPr>
+              <a:t>p</a:t>
+            </a:r>
+            <a:r>
+              <a:rPr b="0" lang="en-US" sz="2000" spc="-1" strike="noStrike">
+                <a:latin typeface="Arial"/>
+              </a:rPr>
+              <a:t>a</a:t>
+            </a:r>
+            <a:r>
+              <a:rPr b="0" lang="en-US" sz="2000" spc="-1" strike="noStrike">
+                <a:latin typeface="Arial"/>
+              </a:rPr>
+              <a:t>s</a:t>
+            </a:r>
+            <a:r>
+              <a:rPr b="0" lang="en-US" sz="2000" spc="-1" strike="noStrike">
+                <a:latin typeface="Arial"/>
+              </a:rPr>
+              <a:t>s</a:t>
+            </a:r>
+            <a:r>
+              <a:rPr b="0" lang="en-US" sz="2000" spc="-1" strike="noStrike">
+                <a:latin typeface="Arial"/>
+              </a:rPr>
+              <a:t>u</a:t>
+            </a:r>
+            <a:r>
+              <a:rPr b="0" lang="en-US" sz="2000" spc="-1" strike="noStrike">
+                <a:latin typeface="Arial"/>
+              </a:rPr>
+              <a:t>n</a:t>
+            </a:r>
+            <a:r>
+              <a:rPr b="0" lang="en-US" sz="2000" spc="-1" strike="noStrike">
+                <a:latin typeface="Arial"/>
+              </a:rPr>
+              <a:t>g</a:t>
+            </a:r>
+            <a:r>
+              <a:rPr b="0" lang="en-US" sz="2000" spc="-1" strike="noStrike">
+                <a:latin typeface="Arial"/>
+              </a:rPr>
+              <a:t>s</a:t>
+            </a:r>
+            <a:r>
+              <a:rPr b="0" lang="en-US" sz="2000" spc="-1" strike="noStrike">
+                <a:latin typeface="Arial"/>
+              </a:rPr>
+              <a:t>f</a:t>
+            </a:r>
+            <a:r>
+              <a:rPr b="0" lang="en-US" sz="2000" spc="-1" strike="noStrike">
+                <a:latin typeface="Arial"/>
+              </a:rPr>
+              <a:t>ä</a:t>
+            </a:r>
+            <a:r>
+              <a:rPr b="0" lang="en-US" sz="2000" spc="-1" strike="noStrike">
+                <a:latin typeface="Arial"/>
+              </a:rPr>
+              <a:t>h</a:t>
+            </a:r>
+            <a:r>
+              <a:rPr b="0" lang="en-US" sz="2000" spc="-1" strike="noStrike">
+                <a:latin typeface="Arial"/>
+              </a:rPr>
+              <a:t>i</a:t>
+            </a:r>
+            <a:r>
+              <a:rPr b="0" lang="en-US" sz="2000" spc="-1" strike="noStrike">
+                <a:latin typeface="Arial"/>
+              </a:rPr>
+              <a:t>g</a:t>
             </a:r>
             <a:endParaRPr b="0" lang="en-US" sz="2000" spc="-1" strike="noStrike">
               <a:latin typeface="Arial"/>
@@ -263,7 +663,7 @@
       </p:sp>
       <p:sp>
         <p:nvSpPr>
-          <p:cNvPr id="73" name="TextShape 2"/>
+          <p:cNvPr id="78" name="TextShape 2"/>
           <p:cNvSpPr txBox="1"/>
           <p:nvPr/>
         </p:nvSpPr>
@@ -288,7 +688,7 @@
                 <a:spcPct val="100000"/>
               </a:lnSpc>
             </a:pPr>
-            <a:fld id="{50F65711-CA33-49EB-81CB-EEF673DA42CC}" type="slidenum">
+            <a:fld id="{C03ABECB-FE39-480D-9838-FF5A83BB21D1}" type="slidenum">
               <a:rPr b="0" lang="en-US" sz="1200" spc="-1" strike="noStrike">
                 <a:solidFill>
                   <a:srgbClr val="000000"/>
@@ -296,7 +696,7 @@
                 <a:latin typeface="+mn-lt"/>
                 <a:ea typeface="+mn-ea"/>
               </a:rPr>
-              <a:t>&lt;number&gt;</a:t>
+              <a:t>1</a:t>
             </a:fld>
             <a:endParaRPr b="0" lang="en-US" sz="1200" spc="-1" strike="noStrike">
               <a:latin typeface="Times New Roman"/>
@@ -350,7 +750,7 @@
       </p:grpSpPr>
       <p:sp>
         <p:nvSpPr>
-          <p:cNvPr id="50" name="PlaceHolder 1"/>
+          <p:cNvPr id="51" name="PlaceHolder 1"/>
           <p:cNvSpPr>
             <a:spLocks noGrp="1"/>
           </p:cNvSpPr>
@@ -381,7 +781,7 @@
       </p:sp>
       <p:sp>
         <p:nvSpPr>
-          <p:cNvPr id="51" name="PlaceHolder 2"/>
+          <p:cNvPr id="52" name="PlaceHolder 2"/>
           <p:cNvSpPr>
             <a:spLocks noGrp="1"/>
           </p:cNvSpPr>
@@ -414,7 +814,7 @@
       </p:sp>
       <p:sp>
         <p:nvSpPr>
-          <p:cNvPr id="52" name="PlaceHolder 3"/>
+          <p:cNvPr id="53" name="PlaceHolder 3"/>
           <p:cNvSpPr>
             <a:spLocks noGrp="1"/>
           </p:cNvSpPr>
@@ -469,7 +869,7 @@
       </p:grpSpPr>
       <p:sp>
         <p:nvSpPr>
-          <p:cNvPr id="53" name="PlaceHolder 1"/>
+          <p:cNvPr id="54" name="PlaceHolder 1"/>
           <p:cNvSpPr>
             <a:spLocks noGrp="1"/>
           </p:cNvSpPr>
@@ -500,7 +900,7 @@
       </p:sp>
       <p:sp>
         <p:nvSpPr>
-          <p:cNvPr id="54" name="PlaceHolder 2"/>
+          <p:cNvPr id="55" name="PlaceHolder 2"/>
           <p:cNvSpPr>
             <a:spLocks noGrp="1"/>
           </p:cNvSpPr>
@@ -533,7 +933,7 @@
       </p:sp>
       <p:sp>
         <p:nvSpPr>
-          <p:cNvPr id="55" name="PlaceHolder 3"/>
+          <p:cNvPr id="56" name="PlaceHolder 3"/>
           <p:cNvSpPr>
             <a:spLocks noGrp="1"/>
           </p:cNvSpPr>
@@ -566,7 +966,7 @@
       </p:sp>
       <p:sp>
         <p:nvSpPr>
-          <p:cNvPr id="56" name="PlaceHolder 4"/>
+          <p:cNvPr id="57" name="PlaceHolder 4"/>
           <p:cNvSpPr>
             <a:spLocks noGrp="1"/>
           </p:cNvSpPr>
@@ -599,7 +999,7 @@
       </p:sp>
       <p:sp>
         <p:nvSpPr>
-          <p:cNvPr id="57" name="PlaceHolder 5"/>
+          <p:cNvPr id="58" name="PlaceHolder 5"/>
           <p:cNvSpPr>
             <a:spLocks noGrp="1"/>
           </p:cNvSpPr>
@@ -654,7 +1054,7 @@
       </p:grpSpPr>
       <p:sp>
         <p:nvSpPr>
-          <p:cNvPr id="58" name="PlaceHolder 1"/>
+          <p:cNvPr id="59" name="PlaceHolder 1"/>
           <p:cNvSpPr>
             <a:spLocks noGrp="1"/>
           </p:cNvSpPr>
@@ -685,7 +1085,7 @@
       </p:sp>
       <p:sp>
         <p:nvSpPr>
-          <p:cNvPr id="59" name="PlaceHolder 2"/>
+          <p:cNvPr id="60" name="PlaceHolder 2"/>
           <p:cNvSpPr>
             <a:spLocks noGrp="1"/>
           </p:cNvSpPr>
@@ -718,7 +1118,7 @@
       </p:sp>
       <p:sp>
         <p:nvSpPr>
-          <p:cNvPr id="60" name="PlaceHolder 3"/>
+          <p:cNvPr id="61" name="PlaceHolder 3"/>
           <p:cNvSpPr>
             <a:spLocks noGrp="1"/>
           </p:cNvSpPr>
@@ -751,7 +1151,7 @@
       </p:sp>
       <p:sp>
         <p:nvSpPr>
-          <p:cNvPr id="61" name="PlaceHolder 4"/>
+          <p:cNvPr id="62" name="PlaceHolder 4"/>
           <p:cNvSpPr>
             <a:spLocks noGrp="1"/>
           </p:cNvSpPr>
@@ -784,7 +1184,7 @@
       </p:sp>
       <p:sp>
         <p:nvSpPr>
-          <p:cNvPr id="62" name="PlaceHolder 5"/>
+          <p:cNvPr id="63" name="PlaceHolder 5"/>
           <p:cNvSpPr>
             <a:spLocks noGrp="1"/>
           </p:cNvSpPr>
@@ -817,7 +1217,7 @@
       </p:sp>
       <p:sp>
         <p:nvSpPr>
-          <p:cNvPr id="63" name="PlaceHolder 6"/>
+          <p:cNvPr id="64" name="PlaceHolder 6"/>
           <p:cNvSpPr>
             <a:spLocks noGrp="1"/>
           </p:cNvSpPr>
@@ -850,7 +1250,7 @@
       </p:sp>
       <p:sp>
         <p:nvSpPr>
-          <p:cNvPr id="64" name="PlaceHolder 7"/>
+          <p:cNvPr id="65" name="PlaceHolder 7"/>
           <p:cNvSpPr>
             <a:spLocks noGrp="1"/>
           </p:cNvSpPr>
@@ -905,7 +1305,7 @@
       </p:grpSpPr>
       <p:sp>
         <p:nvSpPr>
-          <p:cNvPr id="29" name="PlaceHolder 1"/>
+          <p:cNvPr id="30" name="PlaceHolder 1"/>
           <p:cNvSpPr>
             <a:spLocks noGrp="1"/>
           </p:cNvSpPr>
@@ -936,7 +1336,7 @@
       </p:sp>
       <p:sp>
         <p:nvSpPr>
-          <p:cNvPr id="30" name="PlaceHolder 2"/>
+          <p:cNvPr id="31" name="PlaceHolder 2"/>
           <p:cNvSpPr>
             <a:spLocks noGrp="1"/>
           </p:cNvSpPr>
@@ -987,7 +1387,7 @@
       </p:grpSpPr>
       <p:sp>
         <p:nvSpPr>
-          <p:cNvPr id="31" name="PlaceHolder 1"/>
+          <p:cNvPr id="32" name="PlaceHolder 1"/>
           <p:cNvSpPr>
             <a:spLocks noGrp="1"/>
           </p:cNvSpPr>
@@ -1018,7 +1418,7 @@
       </p:sp>
       <p:sp>
         <p:nvSpPr>
-          <p:cNvPr id="32" name="PlaceHolder 2"/>
+          <p:cNvPr id="33" name="PlaceHolder 2"/>
           <p:cNvSpPr>
             <a:spLocks noGrp="1"/>
           </p:cNvSpPr>
@@ -1073,7 +1473,7 @@
       </p:grpSpPr>
       <p:sp>
         <p:nvSpPr>
-          <p:cNvPr id="33" name="PlaceHolder 1"/>
+          <p:cNvPr id="34" name="PlaceHolder 1"/>
           <p:cNvSpPr>
             <a:spLocks noGrp="1"/>
           </p:cNvSpPr>
@@ -1104,7 +1504,7 @@
       </p:sp>
       <p:sp>
         <p:nvSpPr>
-          <p:cNvPr id="34" name="PlaceHolder 2"/>
+          <p:cNvPr id="35" name="PlaceHolder 2"/>
           <p:cNvSpPr>
             <a:spLocks noGrp="1"/>
           </p:cNvSpPr>
@@ -1137,7 +1537,7 @@
       </p:sp>
       <p:sp>
         <p:nvSpPr>
-          <p:cNvPr id="35" name="PlaceHolder 3"/>
+          <p:cNvPr id="36" name="PlaceHolder 3"/>
           <p:cNvSpPr>
             <a:spLocks noGrp="1"/>
           </p:cNvSpPr>
@@ -1192,7 +1592,7 @@
       </p:grpSpPr>
       <p:sp>
         <p:nvSpPr>
-          <p:cNvPr id="36" name="PlaceHolder 1"/>
+          <p:cNvPr id="37" name="PlaceHolder 1"/>
           <p:cNvSpPr>
             <a:spLocks noGrp="1"/>
           </p:cNvSpPr>
@@ -1245,7 +1645,7 @@
       </p:grpSpPr>
       <p:sp>
         <p:nvSpPr>
-          <p:cNvPr id="37" name="PlaceHolder 1"/>
+          <p:cNvPr id="38" name="PlaceHolder 1"/>
           <p:cNvSpPr>
             <a:spLocks noGrp="1"/>
           </p:cNvSpPr>
@@ -1296,7 +1696,7 @@
       </p:grpSpPr>
       <p:sp>
         <p:nvSpPr>
-          <p:cNvPr id="38" name="PlaceHolder 1"/>
+          <p:cNvPr id="39" name="PlaceHolder 1"/>
           <p:cNvSpPr>
             <a:spLocks noGrp="1"/>
           </p:cNvSpPr>
@@ -1327,7 +1727,7 @@
       </p:sp>
       <p:sp>
         <p:nvSpPr>
-          <p:cNvPr id="39" name="PlaceHolder 2"/>
+          <p:cNvPr id="40" name="PlaceHolder 2"/>
           <p:cNvSpPr>
             <a:spLocks noGrp="1"/>
           </p:cNvSpPr>
@@ -1360,7 +1760,7 @@
       </p:sp>
       <p:sp>
         <p:nvSpPr>
-          <p:cNvPr id="40" name="PlaceHolder 3"/>
+          <p:cNvPr id="41" name="PlaceHolder 3"/>
           <p:cNvSpPr>
             <a:spLocks noGrp="1"/>
           </p:cNvSpPr>
@@ -1393,7 +1793,7 @@
       </p:sp>
       <p:sp>
         <p:nvSpPr>
-          <p:cNvPr id="41" name="PlaceHolder 4"/>
+          <p:cNvPr id="42" name="PlaceHolder 4"/>
           <p:cNvSpPr>
             <a:spLocks noGrp="1"/>
           </p:cNvSpPr>
@@ -1448,7 +1848,7 @@
       </p:grpSpPr>
       <p:sp>
         <p:nvSpPr>
-          <p:cNvPr id="42" name="PlaceHolder 1"/>
+          <p:cNvPr id="43" name="PlaceHolder 1"/>
           <p:cNvSpPr>
             <a:spLocks noGrp="1"/>
           </p:cNvSpPr>
@@ -1479,7 +1879,7 @@
       </p:sp>
       <p:sp>
         <p:nvSpPr>
-          <p:cNvPr id="43" name="PlaceHolder 2"/>
+          <p:cNvPr id="44" name="PlaceHolder 2"/>
           <p:cNvSpPr>
             <a:spLocks noGrp="1"/>
           </p:cNvSpPr>
@@ -1512,7 +1912,7 @@
       </p:sp>
       <p:sp>
         <p:nvSpPr>
-          <p:cNvPr id="44" name="PlaceHolder 3"/>
+          <p:cNvPr id="45" name="PlaceHolder 3"/>
           <p:cNvSpPr>
             <a:spLocks noGrp="1"/>
           </p:cNvSpPr>
@@ -1545,7 +1945,7 @@
       </p:sp>
       <p:sp>
         <p:nvSpPr>
-          <p:cNvPr id="45" name="PlaceHolder 4"/>
+          <p:cNvPr id="46" name="PlaceHolder 4"/>
           <p:cNvSpPr>
             <a:spLocks noGrp="1"/>
           </p:cNvSpPr>
@@ -1600,7 +2000,7 @@
       </p:grpSpPr>
       <p:sp>
         <p:nvSpPr>
-          <p:cNvPr id="46" name="PlaceHolder 1"/>
+          <p:cNvPr id="47" name="PlaceHolder 1"/>
           <p:cNvSpPr>
             <a:spLocks noGrp="1"/>
           </p:cNvSpPr>
@@ -1631,7 +2031,7 @@
       </p:sp>
       <p:sp>
         <p:nvSpPr>
-          <p:cNvPr id="47" name="PlaceHolder 2"/>
+          <p:cNvPr id="48" name="PlaceHolder 2"/>
           <p:cNvSpPr>
             <a:spLocks noGrp="1"/>
           </p:cNvSpPr>
@@ -1664,7 +2064,7 @@
       </p:sp>
       <p:sp>
         <p:nvSpPr>
-          <p:cNvPr id="48" name="PlaceHolder 3"/>
+          <p:cNvPr id="49" name="PlaceHolder 3"/>
           <p:cNvSpPr>
             <a:spLocks noGrp="1"/>
           </p:cNvSpPr>
@@ -1697,7 +2097,7 @@
       </p:sp>
       <p:sp>
         <p:nvSpPr>
-          <p:cNvPr id="49" name="PlaceHolder 4"/>
+          <p:cNvPr id="50" name="PlaceHolder 4"/>
           <p:cNvSpPr>
             <a:spLocks noGrp="1"/>
           </p:cNvSpPr>
@@ -2842,7 +3242,7 @@
         </p:nvSpPr>
         <p:spPr>
           <a:xfrm>
-            <a:off x="3240" y="6346440"/>
+            <a:off x="0" y="6359400"/>
             <a:ext cx="9121680" cy="501120"/>
           </a:xfrm>
           <a:prstGeom prst="rect">
@@ -2865,7 +3265,317 @@
                 <a:latin typeface="Calibri"/>
                 <a:ea typeface="Calibri"/>
               </a:rPr>
-              <a:t>Datenverarbeitung in der Technik</a:t>
+              <a:t>D</a:t>
+            </a:r>
+            <a:r>
+              <a:rPr b="0" lang="en-US" sz="1600" spc="-1" strike="noStrike">
+                <a:solidFill>
+                  <a:srgbClr val="000000"/>
+                </a:solidFill>
+                <a:latin typeface="Calibri"/>
+                <a:ea typeface="Calibri"/>
+              </a:rPr>
+              <a:t>a</a:t>
+            </a:r>
+            <a:r>
+              <a:rPr b="0" lang="en-US" sz="1600" spc="-1" strike="noStrike">
+                <a:solidFill>
+                  <a:srgbClr val="000000"/>
+                </a:solidFill>
+                <a:latin typeface="Calibri"/>
+                <a:ea typeface="Calibri"/>
+              </a:rPr>
+              <a:t>t</a:t>
+            </a:r>
+            <a:r>
+              <a:rPr b="0" lang="en-US" sz="1600" spc="-1" strike="noStrike">
+                <a:solidFill>
+                  <a:srgbClr val="000000"/>
+                </a:solidFill>
+                <a:latin typeface="Calibri"/>
+                <a:ea typeface="Calibri"/>
+              </a:rPr>
+              <a:t>e</a:t>
+            </a:r>
+            <a:r>
+              <a:rPr b="0" lang="en-US" sz="1600" spc="-1" strike="noStrike">
+                <a:solidFill>
+                  <a:srgbClr val="000000"/>
+                </a:solidFill>
+                <a:latin typeface="Calibri"/>
+                <a:ea typeface="Calibri"/>
+              </a:rPr>
+              <a:t>n</a:t>
+            </a:r>
+            <a:r>
+              <a:rPr b="0" lang="en-US" sz="1600" spc="-1" strike="noStrike">
+                <a:solidFill>
+                  <a:srgbClr val="000000"/>
+                </a:solidFill>
+                <a:latin typeface="Calibri"/>
+                <a:ea typeface="Calibri"/>
+              </a:rPr>
+              <a:t>v</a:t>
+            </a:r>
+            <a:r>
+              <a:rPr b="0" lang="en-US" sz="1600" spc="-1" strike="noStrike">
+                <a:solidFill>
+                  <a:srgbClr val="000000"/>
+                </a:solidFill>
+                <a:latin typeface="Calibri"/>
+                <a:ea typeface="Calibri"/>
+              </a:rPr>
+              <a:t>e</a:t>
+            </a:r>
+            <a:r>
+              <a:rPr b="0" lang="en-US" sz="1600" spc="-1" strike="noStrike">
+                <a:solidFill>
+                  <a:srgbClr val="000000"/>
+                </a:solidFill>
+                <a:latin typeface="Calibri"/>
+                <a:ea typeface="Calibri"/>
+              </a:rPr>
+              <a:t>r</a:t>
+            </a:r>
+            <a:r>
+              <a:rPr b="0" lang="en-US" sz="1600" spc="-1" strike="noStrike">
+                <a:solidFill>
+                  <a:srgbClr val="000000"/>
+                </a:solidFill>
+                <a:latin typeface="Calibri"/>
+                <a:ea typeface="Calibri"/>
+              </a:rPr>
+              <a:t>a</a:t>
+            </a:r>
+            <a:r>
+              <a:rPr b="0" lang="en-US" sz="1600" spc="-1" strike="noStrike">
+                <a:solidFill>
+                  <a:srgbClr val="000000"/>
+                </a:solidFill>
+                <a:latin typeface="Calibri"/>
+                <a:ea typeface="Calibri"/>
+              </a:rPr>
+              <a:t>r</a:t>
+            </a:r>
+            <a:r>
+              <a:rPr b="0" lang="en-US" sz="1600" spc="-1" strike="noStrike">
+                <a:solidFill>
+                  <a:srgbClr val="000000"/>
+                </a:solidFill>
+                <a:latin typeface="Calibri"/>
+                <a:ea typeface="Calibri"/>
+              </a:rPr>
+              <a:t>b</a:t>
+            </a:r>
+            <a:r>
+              <a:rPr b="0" lang="en-US" sz="1600" spc="-1" strike="noStrike">
+                <a:solidFill>
+                  <a:srgbClr val="000000"/>
+                </a:solidFill>
+                <a:latin typeface="Calibri"/>
+                <a:ea typeface="Calibri"/>
+              </a:rPr>
+              <a:t>e</a:t>
+            </a:r>
+            <a:r>
+              <a:rPr b="0" lang="en-US" sz="1600" spc="-1" strike="noStrike">
+                <a:solidFill>
+                  <a:srgbClr val="000000"/>
+                </a:solidFill>
+                <a:latin typeface="Calibri"/>
+                <a:ea typeface="Calibri"/>
+              </a:rPr>
+              <a:t>i</a:t>
+            </a:r>
+            <a:r>
+              <a:rPr b="0" lang="en-US" sz="1600" spc="-1" strike="noStrike">
+                <a:solidFill>
+                  <a:srgbClr val="000000"/>
+                </a:solidFill>
+                <a:latin typeface="Calibri"/>
+                <a:ea typeface="Calibri"/>
+              </a:rPr>
+              <a:t>t</a:t>
+            </a:r>
+            <a:r>
+              <a:rPr b="0" lang="en-US" sz="1600" spc="-1" strike="noStrike">
+                <a:solidFill>
+                  <a:srgbClr val="000000"/>
+                </a:solidFill>
+                <a:latin typeface="Calibri"/>
+                <a:ea typeface="Calibri"/>
+              </a:rPr>
+              <a:t>u</a:t>
+            </a:r>
+            <a:r>
+              <a:rPr b="0" lang="en-US" sz="1600" spc="-1" strike="noStrike">
+                <a:solidFill>
+                  <a:srgbClr val="000000"/>
+                </a:solidFill>
+                <a:latin typeface="Calibri"/>
+                <a:ea typeface="Calibri"/>
+              </a:rPr>
+              <a:t>n</a:t>
+            </a:r>
+            <a:r>
+              <a:rPr b="0" lang="en-US" sz="1600" spc="-1" strike="noStrike">
+                <a:solidFill>
+                  <a:srgbClr val="000000"/>
+                </a:solidFill>
+                <a:latin typeface="Calibri"/>
+                <a:ea typeface="Calibri"/>
+              </a:rPr>
+              <a:t>g</a:t>
+            </a:r>
+            <a:r>
+              <a:rPr b="0" lang="en-US" sz="1600" spc="-1" strike="noStrike">
+                <a:solidFill>
+                  <a:srgbClr val="000000"/>
+                </a:solidFill>
+                <a:latin typeface="Calibri"/>
+                <a:ea typeface="Calibri"/>
+              </a:rPr>
+              <a:t> </a:t>
+            </a:r>
+            <a:r>
+              <a:rPr b="0" lang="en-US" sz="1600" spc="-1" strike="noStrike">
+                <a:solidFill>
+                  <a:srgbClr val="000000"/>
+                </a:solidFill>
+                <a:latin typeface="Calibri"/>
+                <a:ea typeface="Calibri"/>
+              </a:rPr>
+              <a:t>i</a:t>
+            </a:r>
+            <a:r>
+              <a:rPr b="0" lang="en-US" sz="1600" spc="-1" strike="noStrike">
+                <a:solidFill>
+                  <a:srgbClr val="000000"/>
+                </a:solidFill>
+                <a:latin typeface="Calibri"/>
+                <a:ea typeface="Calibri"/>
+              </a:rPr>
+              <a:t>n</a:t>
+            </a:r>
+            <a:r>
+              <a:rPr b="0" lang="en-US" sz="1600" spc="-1" strike="noStrike">
+                <a:solidFill>
+                  <a:srgbClr val="000000"/>
+                </a:solidFill>
+                <a:latin typeface="Calibri"/>
+                <a:ea typeface="Calibri"/>
+              </a:rPr>
+              <a:t> </a:t>
+            </a:r>
+            <a:r>
+              <a:rPr b="0" lang="en-US" sz="1600" spc="-1" strike="noStrike">
+                <a:solidFill>
+                  <a:srgbClr val="000000"/>
+                </a:solidFill>
+                <a:latin typeface="Calibri"/>
+                <a:ea typeface="Calibri"/>
+              </a:rPr>
+              <a:t>d</a:t>
+            </a:r>
+            <a:r>
+              <a:rPr b="0" lang="en-US" sz="1600" spc="-1" strike="noStrike">
+                <a:solidFill>
+                  <a:srgbClr val="000000"/>
+                </a:solidFill>
+                <a:latin typeface="Calibri"/>
+                <a:ea typeface="Calibri"/>
+              </a:rPr>
+              <a:t>e</a:t>
+            </a:r>
+            <a:r>
+              <a:rPr b="0" lang="en-US" sz="1600" spc="-1" strike="noStrike">
+                <a:solidFill>
+                  <a:srgbClr val="000000"/>
+                </a:solidFill>
+                <a:latin typeface="Calibri"/>
+                <a:ea typeface="Calibri"/>
+              </a:rPr>
+              <a:t>r</a:t>
+            </a:r>
+            <a:r>
+              <a:rPr b="0" lang="en-US" sz="1600" spc="-1" strike="noStrike">
+                <a:solidFill>
+                  <a:srgbClr val="000000"/>
+                </a:solidFill>
+                <a:latin typeface="Calibri"/>
+                <a:ea typeface="Calibri"/>
+              </a:rPr>
+              <a:t> </a:t>
+            </a:r>
+            <a:r>
+              <a:rPr b="0" lang="en-US" sz="1600" spc="-1" strike="noStrike">
+                <a:solidFill>
+                  <a:srgbClr val="000000"/>
+                </a:solidFill>
+                <a:latin typeface="Calibri"/>
+                <a:ea typeface="Calibri"/>
+              </a:rPr>
+              <a:t>T</a:t>
+            </a:r>
+            <a:r>
+              <a:rPr b="0" lang="en-US" sz="1600" spc="-1" strike="noStrike">
+                <a:solidFill>
+                  <a:srgbClr val="000000"/>
+                </a:solidFill>
+                <a:latin typeface="Calibri"/>
+                <a:ea typeface="Calibri"/>
+              </a:rPr>
+              <a:t>e</a:t>
+            </a:r>
+            <a:r>
+              <a:rPr b="0" lang="en-US" sz="1600" spc="-1" strike="noStrike">
+                <a:solidFill>
+                  <a:srgbClr val="000000"/>
+                </a:solidFill>
+                <a:latin typeface="Calibri"/>
+                <a:ea typeface="Calibri"/>
+              </a:rPr>
+              <a:t>c</a:t>
+            </a:r>
+            <a:r>
+              <a:rPr b="0" lang="en-US" sz="1600" spc="-1" strike="noStrike">
+                <a:solidFill>
+                  <a:srgbClr val="000000"/>
+                </a:solidFill>
+                <a:latin typeface="Calibri"/>
+                <a:ea typeface="Calibri"/>
+              </a:rPr>
+              <a:t>h</a:t>
+            </a:r>
+            <a:r>
+              <a:rPr b="0" lang="en-US" sz="1600" spc="-1" strike="noStrike">
+                <a:solidFill>
+                  <a:srgbClr val="000000"/>
+                </a:solidFill>
+                <a:latin typeface="Calibri"/>
+                <a:ea typeface="Calibri"/>
+              </a:rPr>
+              <a:t>n</a:t>
+            </a:r>
+            <a:r>
+              <a:rPr b="0" lang="en-US" sz="1600" spc="-1" strike="noStrike">
+                <a:solidFill>
+                  <a:srgbClr val="000000"/>
+                </a:solidFill>
+                <a:latin typeface="Calibri"/>
+                <a:ea typeface="Calibri"/>
+              </a:rPr>
+              <a:t>i</a:t>
+            </a:r>
+            <a:r>
+              <a:rPr b="0" lang="en-US" sz="1600" spc="-1" strike="noStrike">
+                <a:solidFill>
+                  <a:srgbClr val="000000"/>
+                </a:solidFill>
+                <a:latin typeface="Calibri"/>
+                <a:ea typeface="Calibri"/>
+              </a:rPr>
+              <a:t>k</a:t>
             </a:r>
             <a:endParaRPr b="0" lang="en-US" sz="1600" spc="-1" strike="noStrike">
               <a:latin typeface="Times New Roman"/>
@@ -2955,7 +3665,7 @@
                 <a:spcPct val="100000"/>
               </a:lnSpc>
             </a:pPr>
-            <a:fld id="{4797EA60-9A0E-46CE-804C-49EF02F1E127}" type="slidenum">
+            <a:fld id="{A2D759DF-A1EC-442E-9269-4F9B9DD8E470}" type="slidenum">
               <a:rPr b="0" lang="en-US" sz="1600" spc="-1" strike="noStrike">
                 <a:solidFill>
                   <a:srgbClr val="000000"/>
@@ -2967,6 +3677,352 @@
             </a:fld>
             <a:endParaRPr b="0" lang="en-US" sz="1600" spc="-1" strike="noStrike">
               <a:latin typeface="Arial"/>
+            </a:endParaRPr>
+          </a:p>
+        </p:txBody>
+      </p:sp>
+      <p:sp>
+        <p:nvSpPr>
+          <p:cNvPr id="29" name="PlaceHolder 28"/>
+          <p:cNvSpPr>
+            <a:spLocks noGrp="1"/>
+          </p:cNvSpPr>
+          <p:nvPr>
+            <p:ph type="title"/>
+          </p:nvPr>
+        </p:nvSpPr>
+        <p:spPr>
+          <a:xfrm>
+            <a:off x="457200" y="273600"/>
+            <a:ext cx="8229240" cy="1144800"/>
+          </a:xfrm>
+          <a:prstGeom prst="rect">
+            <a:avLst/>
+          </a:prstGeom>
+        </p:spPr>
+        <p:txBody>
+          <a:bodyPr lIns="0" rIns="0" tIns="0" bIns="0" anchor="ctr"/>
+          <a:p>
+            <a:r>
+              <a:rPr b="0" lang="de-DE" sz="1800" spc="-1" strike="noStrike">
+                <a:solidFill>
+                  <a:srgbClr val="000000"/>
+                </a:solidFill>
+                <a:latin typeface="Calibri"/>
+              </a:rPr>
+              <a:t>C</a:t>
+            </a:r>
+            <a:r>
+              <a:rPr b="0" lang="de-DE" sz="1800" spc="-1" strike="noStrike">
+                <a:solidFill>
+                  <a:srgbClr val="000000"/>
+                </a:solidFill>
+                <a:latin typeface="Calibri"/>
+              </a:rPr>
+              <a:t>l</a:t>
+            </a:r>
+            <a:r>
+              <a:rPr b="0" lang="de-DE" sz="1800" spc="-1" strike="noStrike">
+                <a:solidFill>
+                  <a:srgbClr val="000000"/>
+                </a:solidFill>
+                <a:latin typeface="Calibri"/>
+              </a:rPr>
+              <a:t>i</a:t>
+            </a:r>
+            <a:r>
+              <a:rPr b="0" lang="de-DE" sz="1800" spc="-1" strike="noStrike">
+                <a:solidFill>
+                  <a:srgbClr val="000000"/>
+                </a:solidFill>
+                <a:latin typeface="Calibri"/>
+              </a:rPr>
+              <a:t>c</a:t>
+            </a:r>
+            <a:r>
+              <a:rPr b="0" lang="de-DE" sz="1800" spc="-1" strike="noStrike">
+                <a:solidFill>
+                  <a:srgbClr val="000000"/>
+                </a:solidFill>
+                <a:latin typeface="Calibri"/>
+              </a:rPr>
+              <a:t>k</a:t>
+            </a:r>
+            <a:r>
+              <a:rPr b="0" lang="de-DE" sz="1800" spc="-1" strike="noStrike">
+                <a:solidFill>
+                  <a:srgbClr val="000000"/>
+                </a:solidFill>
+                <a:latin typeface="Calibri"/>
+              </a:rPr>
+              <a:t> </a:t>
+            </a:r>
+            <a:r>
+              <a:rPr b="0" lang="de-DE" sz="1800" spc="-1" strike="noStrike">
+                <a:solidFill>
+                  <a:srgbClr val="000000"/>
+                </a:solidFill>
+                <a:latin typeface="Calibri"/>
+              </a:rPr>
+              <a:t>t</a:t>
+            </a:r>
+            <a:r>
+              <a:rPr b="0" lang="de-DE" sz="1800" spc="-1" strike="noStrike">
+                <a:solidFill>
+                  <a:srgbClr val="000000"/>
+                </a:solidFill>
+                <a:latin typeface="Calibri"/>
+              </a:rPr>
+              <a:t>o</a:t>
+            </a:r>
+            <a:r>
+              <a:rPr b="0" lang="de-DE" sz="1800" spc="-1" strike="noStrike">
+                <a:solidFill>
+                  <a:srgbClr val="000000"/>
+                </a:solidFill>
+                <a:latin typeface="Calibri"/>
+              </a:rPr>
+              <a:t> </a:t>
+            </a:r>
+            <a:r>
+              <a:rPr b="0" lang="de-DE" sz="1800" spc="-1" strike="noStrike">
+                <a:solidFill>
+                  <a:srgbClr val="000000"/>
+                </a:solidFill>
+                <a:latin typeface="Calibri"/>
+              </a:rPr>
+              <a:t>e</a:t>
+            </a:r>
+            <a:r>
+              <a:rPr b="0" lang="de-DE" sz="1800" spc="-1" strike="noStrike">
+                <a:solidFill>
+                  <a:srgbClr val="000000"/>
+                </a:solidFill>
+                <a:latin typeface="Calibri"/>
+              </a:rPr>
+              <a:t>d</a:t>
+            </a:r>
+            <a:r>
+              <a:rPr b="0" lang="de-DE" sz="1800" spc="-1" strike="noStrike">
+                <a:solidFill>
+                  <a:srgbClr val="000000"/>
+                </a:solidFill>
+                <a:latin typeface="Calibri"/>
+              </a:rPr>
+              <a:t>i</a:t>
+            </a:r>
+            <a:r>
+              <a:rPr b="0" lang="de-DE" sz="1800" spc="-1" strike="noStrike">
+                <a:solidFill>
+                  <a:srgbClr val="000000"/>
+                </a:solidFill>
+                <a:latin typeface="Calibri"/>
+              </a:rPr>
+              <a:t>t</a:t>
+            </a:r>
+            <a:r>
+              <a:rPr b="0" lang="de-DE" sz="1800" spc="-1" strike="noStrike">
+                <a:solidFill>
+                  <a:srgbClr val="000000"/>
+                </a:solidFill>
+                <a:latin typeface="Calibri"/>
+              </a:rPr>
+              <a:t> </a:t>
+            </a:r>
+            <a:r>
+              <a:rPr b="0" lang="de-DE" sz="1800" spc="-1" strike="noStrike">
+                <a:solidFill>
+                  <a:srgbClr val="000000"/>
+                </a:solidFill>
+                <a:latin typeface="Calibri"/>
+              </a:rPr>
+              <a:t>t</a:t>
+            </a:r>
+            <a:r>
+              <a:rPr b="0" lang="de-DE" sz="1800" spc="-1" strike="noStrike">
+                <a:solidFill>
+                  <a:srgbClr val="000000"/>
+                </a:solidFill>
+                <a:latin typeface="Calibri"/>
+              </a:rPr>
+              <a:t>h</a:t>
+            </a:r>
+            <a:r>
+              <a:rPr b="0" lang="de-DE" sz="1800" spc="-1" strike="noStrike">
+                <a:solidFill>
+                  <a:srgbClr val="000000"/>
+                </a:solidFill>
+                <a:latin typeface="Calibri"/>
+              </a:rPr>
+              <a:t>e</a:t>
+            </a:r>
+            <a:r>
+              <a:rPr b="0" lang="de-DE" sz="1800" spc="-1" strike="noStrike">
+                <a:solidFill>
+                  <a:srgbClr val="000000"/>
+                </a:solidFill>
+                <a:latin typeface="Calibri"/>
+              </a:rPr>
+              <a:t> </a:t>
+            </a:r>
+            <a:r>
+              <a:rPr b="0" lang="de-DE" sz="1800" spc="-1" strike="noStrike">
+                <a:solidFill>
+                  <a:srgbClr val="000000"/>
+                </a:solidFill>
+                <a:latin typeface="Calibri"/>
+              </a:rPr>
+              <a:t>t</a:t>
+            </a:r>
+            <a:r>
+              <a:rPr b="0" lang="de-DE" sz="1800" spc="-1" strike="noStrike">
+                <a:solidFill>
+                  <a:srgbClr val="000000"/>
+                </a:solidFill>
+                <a:latin typeface="Calibri"/>
+              </a:rPr>
+              <a:t>i</a:t>
+            </a:r>
+            <a:r>
+              <a:rPr b="0" lang="de-DE" sz="1800" spc="-1" strike="noStrike">
+                <a:solidFill>
+                  <a:srgbClr val="000000"/>
+                </a:solidFill>
+                <a:latin typeface="Calibri"/>
+              </a:rPr>
+              <a:t>t</a:t>
+            </a:r>
+            <a:r>
+              <a:rPr b="0" lang="de-DE" sz="1800" spc="-1" strike="noStrike">
+                <a:solidFill>
+                  <a:srgbClr val="000000"/>
+                </a:solidFill>
+                <a:latin typeface="Calibri"/>
+              </a:rPr>
+              <a:t>l</a:t>
+            </a:r>
+            <a:r>
+              <a:rPr b="0" lang="de-DE" sz="1800" spc="-1" strike="noStrike">
+                <a:solidFill>
+                  <a:srgbClr val="000000"/>
+                </a:solidFill>
+                <a:latin typeface="Calibri"/>
+              </a:rPr>
+              <a:t>e</a:t>
+            </a:r>
+            <a:r>
+              <a:rPr b="0" lang="de-DE" sz="1800" spc="-1" strike="noStrike">
+                <a:solidFill>
+                  <a:srgbClr val="000000"/>
+                </a:solidFill>
+                <a:latin typeface="Calibri"/>
+              </a:rPr>
+              <a:t> </a:t>
+            </a:r>
+            <a:r>
+              <a:rPr b="0" lang="de-DE" sz="1800" spc="-1" strike="noStrike">
+                <a:solidFill>
+                  <a:srgbClr val="000000"/>
+                </a:solidFill>
+                <a:latin typeface="Calibri"/>
+              </a:rPr>
+              <a:t>t</a:t>
+            </a:r>
+            <a:r>
+              <a:rPr b="0" lang="de-DE" sz="1800" spc="-1" strike="noStrike">
+                <a:solidFill>
+                  <a:srgbClr val="000000"/>
+                </a:solidFill>
+                <a:latin typeface="Calibri"/>
+              </a:rPr>
+              <a:t>e</a:t>
+            </a:r>
+            <a:r>
+              <a:rPr b="0" lang="de-DE" sz="1800" spc="-1" strike="noStrike">
+                <a:solidFill>
+                  <a:srgbClr val="000000"/>
+                </a:solidFill>
+                <a:latin typeface="Calibri"/>
+              </a:rPr>
+              <a:t>x</a:t>
+            </a:r>
+            <a:r>
+              <a:rPr b="0" lang="de-DE" sz="1800" spc="-1" strike="noStrike">
+                <a:solidFill>
+                  <a:srgbClr val="000000"/>
+                </a:solidFill>
+                <a:latin typeface="Calibri"/>
+              </a:rPr>
+              <a:t>t</a:t>
+            </a:r>
+            <a:r>
+              <a:rPr b="0" lang="de-DE" sz="1800" spc="-1" strike="noStrike">
+                <a:solidFill>
+                  <a:srgbClr val="000000"/>
+                </a:solidFill>
+                <a:latin typeface="Calibri"/>
+              </a:rPr>
+              <a:t> </a:t>
+            </a:r>
+            <a:r>
+              <a:rPr b="0" lang="de-DE" sz="1800" spc="-1" strike="noStrike">
+                <a:solidFill>
+                  <a:srgbClr val="000000"/>
+                </a:solidFill>
+                <a:latin typeface="Calibri"/>
+              </a:rPr>
+              <a:t>f</a:t>
+            </a:r>
+            <a:r>
+              <a:rPr b="0" lang="de-DE" sz="1800" spc="-1" strike="noStrike">
+                <a:solidFill>
+                  <a:srgbClr val="000000"/>
+                </a:solidFill>
+                <a:latin typeface="Calibri"/>
+              </a:rPr>
+              <a:t>o</a:t>
+            </a:r>
+            <a:r>
+              <a:rPr b="0" lang="de-DE" sz="1800" spc="-1" strike="noStrike">
+                <a:solidFill>
+                  <a:srgbClr val="000000"/>
+                </a:solidFill>
+                <a:latin typeface="Calibri"/>
+              </a:rPr>
+              <a:t>r</a:t>
+            </a:r>
+            <a:r>
+              <a:rPr b="0" lang="de-DE" sz="1800" spc="-1" strike="noStrike">
+                <a:solidFill>
+                  <a:srgbClr val="000000"/>
+                </a:solidFill>
+                <a:latin typeface="Calibri"/>
+              </a:rPr>
+              <a:t>m</a:t>
+            </a:r>
+            <a:r>
+              <a:rPr b="0" lang="de-DE" sz="1800" spc="-1" strike="noStrike">
+                <a:solidFill>
+                  <a:srgbClr val="000000"/>
+                </a:solidFill>
+                <a:latin typeface="Calibri"/>
+              </a:rPr>
+              <a:t>a</a:t>
+            </a:r>
+            <a:r>
+              <a:rPr b="0" lang="de-DE" sz="1800" spc="-1" strike="noStrike">
+                <a:solidFill>
+                  <a:srgbClr val="000000"/>
+                </a:solidFill>
+                <a:latin typeface="Calibri"/>
+              </a:rPr>
+              <a:t>t</a:t>
+            </a:r>
+            <a:endParaRPr b="0" lang="de-DE" sz="1800" spc="-1" strike="noStrike">
+              <a:solidFill>
+                <a:srgbClr val="000000"/>
+              </a:solidFill>
+              <a:latin typeface="Calibri"/>
             </a:endParaRPr>
           </a:p>
         </p:txBody>
@@ -3010,13 +4066,13 @@
       </p:grpSpPr>
       <p:sp>
         <p:nvSpPr>
-          <p:cNvPr id="70" name="TextShape 1"/>
+          <p:cNvPr id="71" name="TextShape 1"/>
           <p:cNvSpPr txBox="1"/>
           <p:nvPr/>
         </p:nvSpPr>
         <p:spPr>
           <a:xfrm>
-            <a:off x="280800" y="6356520"/>
+            <a:off x="393480" y="4846320"/>
             <a:ext cx="8567640" cy="501120"/>
           </a:xfrm>
           <a:prstGeom prst="rect">
@@ -3046,7 +4102,307 @@
                 <a:latin typeface="Calibri"/>
                 <a:ea typeface="Calibri"/>
               </a:rPr>
-              <a:t>Datenverarbeitung in der Technik</a:t>
+              <a:t>D</a:t>
+            </a:r>
+            <a:r>
+              <a:rPr b="0" lang="en-US" sz="1600" spc="-1" strike="noStrike">
+                <a:solidFill>
+                  <a:srgbClr val="000000"/>
+                </a:solidFill>
+                <a:latin typeface="Calibri"/>
+                <a:ea typeface="Calibri"/>
+              </a:rPr>
+              <a:t>a</a:t>
+            </a:r>
+            <a:r>
+              <a:rPr b="0" lang="en-US" sz="1600" spc="-1" strike="noStrike">
+                <a:solidFill>
+                  <a:srgbClr val="000000"/>
+                </a:solidFill>
+                <a:latin typeface="Calibri"/>
+                <a:ea typeface="Calibri"/>
+              </a:rPr>
+              <a:t>t</a:t>
+            </a:r>
+            <a:r>
+              <a:rPr b="0" lang="en-US" sz="1600" spc="-1" strike="noStrike">
+                <a:solidFill>
+                  <a:srgbClr val="000000"/>
+                </a:solidFill>
+                <a:latin typeface="Calibri"/>
+                <a:ea typeface="Calibri"/>
+              </a:rPr>
+              <a:t>e</a:t>
+            </a:r>
+            <a:r>
+              <a:rPr b="0" lang="en-US" sz="1600" spc="-1" strike="noStrike">
+                <a:solidFill>
+                  <a:srgbClr val="000000"/>
+                </a:solidFill>
+                <a:latin typeface="Calibri"/>
+                <a:ea typeface="Calibri"/>
+              </a:rPr>
+              <a:t>n</a:t>
+            </a:r>
+            <a:r>
+              <a:rPr b="0" lang="en-US" sz="1600" spc="-1" strike="noStrike">
+                <a:solidFill>
+                  <a:srgbClr val="000000"/>
+                </a:solidFill>
+                <a:latin typeface="Calibri"/>
+                <a:ea typeface="Calibri"/>
+              </a:rPr>
+              <a:t>v</a:t>
+            </a:r>
+            <a:r>
+              <a:rPr b="0" lang="en-US" sz="1600" spc="-1" strike="noStrike">
+                <a:solidFill>
+                  <a:srgbClr val="000000"/>
+                </a:solidFill>
+                <a:latin typeface="Calibri"/>
+                <a:ea typeface="Calibri"/>
+              </a:rPr>
+              <a:t>e</a:t>
+            </a:r>
+            <a:r>
+              <a:rPr b="0" lang="en-US" sz="1600" spc="-1" strike="noStrike">
+                <a:solidFill>
+                  <a:srgbClr val="000000"/>
+                </a:solidFill>
+                <a:latin typeface="Calibri"/>
+                <a:ea typeface="Calibri"/>
+              </a:rPr>
+              <a:t>r</a:t>
+            </a:r>
+            <a:r>
+              <a:rPr b="0" lang="en-US" sz="1600" spc="-1" strike="noStrike">
+                <a:solidFill>
+                  <a:srgbClr val="000000"/>
+                </a:solidFill>
+                <a:latin typeface="Calibri"/>
+                <a:ea typeface="Calibri"/>
+              </a:rPr>
+              <a:t>a</a:t>
+            </a:r>
+            <a:r>
+              <a:rPr b="0" lang="en-US" sz="1600" spc="-1" strike="noStrike">
+                <a:solidFill>
+                  <a:srgbClr val="000000"/>
+                </a:solidFill>
+                <a:latin typeface="Calibri"/>
+                <a:ea typeface="Calibri"/>
+              </a:rPr>
+              <a:t>r</a:t>
+            </a:r>
+            <a:r>
+              <a:rPr b="0" lang="en-US" sz="1600" spc="-1" strike="noStrike">
+                <a:solidFill>
+                  <a:srgbClr val="000000"/>
+                </a:solidFill>
+                <a:latin typeface="Calibri"/>
+                <a:ea typeface="Calibri"/>
+              </a:rPr>
+              <a:t>b</a:t>
+            </a:r>
+            <a:r>
+              <a:rPr b="0" lang="en-US" sz="1600" spc="-1" strike="noStrike">
+                <a:solidFill>
+                  <a:srgbClr val="000000"/>
+                </a:solidFill>
+                <a:latin typeface="Calibri"/>
+                <a:ea typeface="Calibri"/>
+              </a:rPr>
+              <a:t>e</a:t>
+            </a:r>
+            <a:r>
+              <a:rPr b="0" lang="en-US" sz="1600" spc="-1" strike="noStrike">
+                <a:solidFill>
+                  <a:srgbClr val="000000"/>
+                </a:solidFill>
+                <a:latin typeface="Calibri"/>
+                <a:ea typeface="Calibri"/>
+              </a:rPr>
+              <a:t>i</a:t>
+            </a:r>
+            <a:r>
+              <a:rPr b="0" lang="en-US" sz="1600" spc="-1" strike="noStrike">
+                <a:solidFill>
+                  <a:srgbClr val="000000"/>
+                </a:solidFill>
+                <a:latin typeface="Calibri"/>
+                <a:ea typeface="Calibri"/>
+              </a:rPr>
+              <a:t>t</a:t>
+            </a:r>
+            <a:r>
+              <a:rPr b="0" lang="en-US" sz="1600" spc="-1" strike="noStrike">
+                <a:solidFill>
+                  <a:srgbClr val="000000"/>
+                </a:solidFill>
+                <a:latin typeface="Calibri"/>
+                <a:ea typeface="Calibri"/>
+              </a:rPr>
+              <a:t>u</a:t>
+            </a:r>
+            <a:r>
+              <a:rPr b="0" lang="en-US" sz="1600" spc="-1" strike="noStrike">
+                <a:solidFill>
+                  <a:srgbClr val="000000"/>
+                </a:solidFill>
+                <a:latin typeface="Calibri"/>
+                <a:ea typeface="Calibri"/>
+              </a:rPr>
+              <a:t>n</a:t>
+            </a:r>
+            <a:r>
+              <a:rPr b="0" lang="en-US" sz="1600" spc="-1" strike="noStrike">
+                <a:solidFill>
+                  <a:srgbClr val="000000"/>
+                </a:solidFill>
+                <a:latin typeface="Calibri"/>
+                <a:ea typeface="Calibri"/>
+              </a:rPr>
+              <a:t>g</a:t>
+            </a:r>
+            <a:r>
+              <a:rPr b="0" lang="en-US" sz="1600" spc="-1" strike="noStrike">
+                <a:solidFill>
+                  <a:srgbClr val="000000"/>
+                </a:solidFill>
+                <a:latin typeface="Calibri"/>
+                <a:ea typeface="Calibri"/>
+              </a:rPr>
+              <a:t> </a:t>
+            </a:r>
+            <a:r>
+              <a:rPr b="0" lang="en-US" sz="1600" spc="-1" strike="noStrike">
+                <a:solidFill>
+                  <a:srgbClr val="000000"/>
+                </a:solidFill>
+                <a:latin typeface="Calibri"/>
+                <a:ea typeface="Calibri"/>
+              </a:rPr>
+              <a:t>i</a:t>
+            </a:r>
+            <a:r>
+              <a:rPr b="0" lang="en-US" sz="1600" spc="-1" strike="noStrike">
+                <a:solidFill>
+                  <a:srgbClr val="000000"/>
+                </a:solidFill>
+                <a:latin typeface="Calibri"/>
+                <a:ea typeface="Calibri"/>
+              </a:rPr>
+              <a:t>n</a:t>
+            </a:r>
+            <a:r>
+              <a:rPr b="0" lang="en-US" sz="1600" spc="-1" strike="noStrike">
+                <a:solidFill>
+                  <a:srgbClr val="000000"/>
+                </a:solidFill>
+                <a:latin typeface="Calibri"/>
+                <a:ea typeface="Calibri"/>
+              </a:rPr>
+              <a:t> </a:t>
+            </a:r>
+            <a:r>
+              <a:rPr b="0" lang="en-US" sz="1600" spc="-1" strike="noStrike">
+                <a:solidFill>
+                  <a:srgbClr val="000000"/>
+                </a:solidFill>
+                <a:latin typeface="Calibri"/>
+                <a:ea typeface="Calibri"/>
+              </a:rPr>
+              <a:t>d</a:t>
+            </a:r>
+            <a:r>
+              <a:rPr b="0" lang="en-US" sz="1600" spc="-1" strike="noStrike">
+                <a:solidFill>
+                  <a:srgbClr val="000000"/>
+                </a:solidFill>
+                <a:latin typeface="Calibri"/>
+                <a:ea typeface="Calibri"/>
+              </a:rPr>
+              <a:t>e</a:t>
+            </a:r>
+            <a:r>
+              <a:rPr b="0" lang="en-US" sz="1600" spc="-1" strike="noStrike">
+                <a:solidFill>
+                  <a:srgbClr val="000000"/>
+                </a:solidFill>
+                <a:latin typeface="Calibri"/>
+                <a:ea typeface="Calibri"/>
+              </a:rPr>
+              <a:t>r </a:t>
+            </a:r>
+            <a:r>
+              <a:rPr b="0" lang="en-US" sz="1600" spc="-1" strike="noStrike">
+                <a:solidFill>
+                  <a:srgbClr val="000000"/>
+                </a:solidFill>
+                <a:latin typeface="Calibri"/>
+                <a:ea typeface="Calibri"/>
+              </a:rPr>
+              <a:t>T</a:t>
+            </a:r>
+            <a:r>
+              <a:rPr b="0" lang="en-US" sz="1600" spc="-1" strike="noStrike">
+                <a:solidFill>
+                  <a:srgbClr val="000000"/>
+                </a:solidFill>
+                <a:latin typeface="Calibri"/>
+                <a:ea typeface="Calibri"/>
+              </a:rPr>
+              <a:t>e</a:t>
+            </a:r>
+            <a:r>
+              <a:rPr b="0" lang="en-US" sz="1600" spc="-1" strike="noStrike">
+                <a:solidFill>
+                  <a:srgbClr val="000000"/>
+                </a:solidFill>
+                <a:latin typeface="Calibri"/>
+                <a:ea typeface="Calibri"/>
+              </a:rPr>
+              <a:t>c</a:t>
+            </a:r>
+            <a:r>
+              <a:rPr b="0" lang="en-US" sz="1600" spc="-1" strike="noStrike">
+                <a:solidFill>
+                  <a:srgbClr val="000000"/>
+                </a:solidFill>
+                <a:latin typeface="Calibri"/>
+                <a:ea typeface="Calibri"/>
+              </a:rPr>
+              <a:t>h</a:t>
+            </a:r>
+            <a:r>
+              <a:rPr b="0" lang="en-US" sz="1600" spc="-1" strike="noStrike">
+                <a:solidFill>
+                  <a:srgbClr val="000000"/>
+                </a:solidFill>
+                <a:latin typeface="Calibri"/>
+                <a:ea typeface="Calibri"/>
+              </a:rPr>
+              <a:t>n</a:t>
+            </a:r>
+            <a:r>
+              <a:rPr b="0" lang="en-US" sz="1600" spc="-1" strike="noStrike">
+                <a:solidFill>
+                  <a:srgbClr val="000000"/>
+                </a:solidFill>
+                <a:latin typeface="Calibri"/>
+                <a:ea typeface="Calibri"/>
+              </a:rPr>
+              <a:t>i</a:t>
+            </a:r>
+            <a:r>
+              <a:rPr b="0" lang="en-US" sz="1600" spc="-1" strike="noStrike">
+                <a:solidFill>
+                  <a:srgbClr val="000000"/>
+                </a:solidFill>
+                <a:latin typeface="Calibri"/>
+                <a:ea typeface="Calibri"/>
+              </a:rPr>
+              <a:t>k</a:t>
             </a:r>
             <a:endParaRPr b="0" lang="en-US" sz="1600" spc="-1" strike="noStrike">
               <a:latin typeface="Times New Roman"/>
@@ -3056,7 +4412,7 @@
       </p:sp>
       <p:sp>
         <p:nvSpPr>
-          <p:cNvPr id="71" name="TextShape 2"/>
+          <p:cNvPr id="72" name="TextShape 2"/>
           <p:cNvSpPr txBox="1"/>
           <p:nvPr/>
         </p:nvSpPr>
@@ -3089,7 +4445,7 @@
                 <a:latin typeface="Calibri"/>
                 <a:ea typeface="Calibri"/>
               </a:rPr>
-              <a:t>Titel</a:t>
+              <a:t>Kommunikation</a:t>
             </a:r>
             <a:endParaRPr b="0" lang="de-DE" sz="4400" spc="-1" strike="noStrike">
               <a:solidFill>
@@ -3112,7 +4468,7 @@
                 <a:latin typeface="Calibri"/>
                 <a:ea typeface="Calibri"/>
               </a:rPr>
-              <a:t>dd - mm - yyyy</a:t>
+              <a:t>15-12-2017</a:t>
             </a:r>
             <a:endParaRPr b="0" lang="de-DE" sz="2000" spc="-1" strike="noStrike">
               <a:solidFill>
@@ -3132,6 +4488,213 @@
           <p:childTnLst>
             <p:seq>
               <p:cTn id="2" nodeType="mainSeq"/>
+              <p:prevCondLst>
+                <p:cond delay="0" evt="onPrev">
+                  <p:tgtEl>
+                    <p:sldTgt/>
+                  </p:tgtEl>
+                </p:cond>
+              </p:prevCondLst>
+              <p:nextCondLst>
+                <p:cond delay="0" evt="onNext">
+                  <p:tgtEl>
+                    <p:sldTgt/>
+                  </p:tgtEl>
+                </p:cond>
+              </p:nextCondLst>
+            </p:seq>
+          </p:childTnLst>
+        </p:cTn>
+      </p:par>
+    </p:tnLst>
+  </p:timing>
+</p:sld>
+</file>
+
+<file path=ppt/slides/slide2.xml><?xml version="1.0" encoding="utf-8"?>
+<p:sld xmlns:a="http://schemas.openxmlformats.org/drawingml/2006/main" xmlns:p="http://schemas.openxmlformats.org/presentationml/2006/main" xmlns:r="http://schemas.openxmlformats.org/officeDocument/2006/relationships" xmlns:p14="http://schemas.microsoft.com/office/powerpoint/2010/main" xmlns:p15="http://schemas.microsoft.com/office/powerpoint/2012/main" xmlns:mc="http://schemas.openxmlformats.org/markup-compatibility/2006">
+  <p:cSld>
+    <p:spTree>
+      <p:nvGrpSpPr>
+        <p:cNvPr id="1" name=""/>
+        <p:cNvGrpSpPr/>
+        <p:nvPr/>
+      </p:nvGrpSpPr>
+      <p:grpSpPr>
+        <a:xfrm>
+          <a:off x="0" y="0"/>
+          <a:ext cx="0" cy="0"/>
+          <a:chOff x="0" y="0"/>
+          <a:chExt cx="0" cy="0"/>
+        </a:xfrm>
+      </p:grpSpPr>
+      <p:pic>
+        <p:nvPicPr>
+          <p:cNvPr id="73" name="" descr=""/>
+          <p:cNvPicPr/>
+          <p:nvPr/>
+        </p:nvPicPr>
+        <p:blipFill>
+          <a:blip r:embed="rId1"/>
+          <a:stretch/>
+        </p:blipFill>
+        <p:spPr>
+          <a:xfrm>
+            <a:off x="360" y="1514880"/>
+            <a:ext cx="9143640" cy="4428720"/>
+          </a:xfrm>
+          <a:prstGeom prst="rect">
+            <a:avLst/>
+          </a:prstGeom>
+          <a:ln>
+            <a:noFill/>
+          </a:ln>
+        </p:spPr>
+      </p:pic>
+    </p:spTree>
+  </p:cSld>
+</p:sld>
+</file>
+
+<file path=ppt/slides/slide3.xml><?xml version="1.0" encoding="utf-8"?>
+<p:sld xmlns:a="http://schemas.openxmlformats.org/drawingml/2006/main" xmlns:p="http://schemas.openxmlformats.org/presentationml/2006/main" xmlns:r="http://schemas.openxmlformats.org/officeDocument/2006/relationships" xmlns:p14="http://schemas.microsoft.com/office/powerpoint/2010/main" xmlns:p15="http://schemas.microsoft.com/office/powerpoint/2012/main" xmlns:mc="http://schemas.openxmlformats.org/markup-compatibility/2006">
+  <p:cSld>
+    <p:spTree>
+      <p:nvGrpSpPr>
+        <p:cNvPr id="1" name=""/>
+        <p:cNvGrpSpPr/>
+        <p:nvPr/>
+      </p:nvGrpSpPr>
+      <p:grpSpPr>
+        <a:xfrm>
+          <a:off x="0" y="0"/>
+          <a:ext cx="0" cy="0"/>
+          <a:chOff x="0" y="0"/>
+          <a:chExt cx="0" cy="0"/>
+        </a:xfrm>
+      </p:grpSpPr>
+      <p:pic>
+        <p:nvPicPr>
+          <p:cNvPr id="74" name="" descr=""/>
+          <p:cNvPicPr/>
+          <p:nvPr/>
+        </p:nvPicPr>
+        <p:blipFill>
+          <a:blip r:embed="rId1"/>
+          <a:stretch/>
+        </p:blipFill>
+        <p:spPr>
+          <a:xfrm>
+            <a:off x="7920" y="548640"/>
+            <a:ext cx="9136080" cy="5577840"/>
+          </a:xfrm>
+          <a:prstGeom prst="rect">
+            <a:avLst/>
+          </a:prstGeom>
+          <a:ln>
+            <a:noFill/>
+          </a:ln>
+        </p:spPr>
+      </p:pic>
+    </p:spTree>
+  </p:cSld>
+</p:sld>
+</file>
+
+<file path=ppt/slides/slide4.xml><?xml version="1.0" encoding="utf-8"?>
+<p:sld xmlns:a="http://schemas.openxmlformats.org/drawingml/2006/main" xmlns:p="http://schemas.openxmlformats.org/presentationml/2006/main" xmlns:r="http://schemas.openxmlformats.org/officeDocument/2006/relationships" xmlns:p14="http://schemas.microsoft.com/office/powerpoint/2010/main" xmlns:p15="http://schemas.microsoft.com/office/powerpoint/2012/main" xmlns:mc="http://schemas.openxmlformats.org/markup-compatibility/2006">
+  <p:cSld>
+    <p:spTree>
+      <p:nvGrpSpPr>
+        <p:cNvPr id="1" name=""/>
+        <p:cNvGrpSpPr/>
+        <p:nvPr/>
+      </p:nvGrpSpPr>
+      <p:grpSpPr>
+        <a:xfrm>
+          <a:off x="0" y="0"/>
+          <a:ext cx="0" cy="0"/>
+          <a:chOff x="0" y="0"/>
+          <a:chExt cx="0" cy="0"/>
+        </a:xfrm>
+      </p:grpSpPr>
+      <p:pic>
+        <p:nvPicPr>
+          <p:cNvPr id="75" name="" descr=""/>
+          <p:cNvPicPr/>
+          <p:nvPr/>
+        </p:nvPicPr>
+        <p:blipFill>
+          <a:blip r:embed="rId1"/>
+          <a:stretch/>
+        </p:blipFill>
+        <p:spPr>
+          <a:xfrm>
+            <a:off x="1828800" y="1240200"/>
+            <a:ext cx="5760720" cy="4886280"/>
+          </a:xfrm>
+          <a:prstGeom prst="rect">
+            <a:avLst/>
+          </a:prstGeom>
+          <a:ln>
+            <a:noFill/>
+          </a:ln>
+        </p:spPr>
+      </p:pic>
+    </p:spTree>
+  </p:cSld>
+</p:sld>
+</file>
+
+<file path=ppt/slides/slide5.xml><?xml version="1.0" encoding="utf-8"?>
+<p:sld xmlns:a="http://schemas.openxmlformats.org/drawingml/2006/main" xmlns:p="http://schemas.openxmlformats.org/presentationml/2006/main" xmlns:r="http://schemas.openxmlformats.org/officeDocument/2006/relationships" xmlns:p14="http://schemas.microsoft.com/office/powerpoint/2010/main" xmlns:p15="http://schemas.microsoft.com/office/powerpoint/2012/main" xmlns:mc="http://schemas.openxmlformats.org/markup-compatibility/2006">
+  <p:cSld>
+    <p:spTree>
+      <p:nvGrpSpPr>
+        <p:cNvPr id="1" name=""/>
+        <p:cNvGrpSpPr/>
+        <p:nvPr/>
+      </p:nvGrpSpPr>
+      <p:grpSpPr>
+        <a:xfrm>
+          <a:off x="0" y="0"/>
+          <a:ext cx="0" cy="0"/>
+          <a:chOff x="0" y="0"/>
+          <a:chExt cx="0" cy="0"/>
+        </a:xfrm>
+      </p:grpSpPr>
+      <p:pic>
+        <p:nvPicPr>
+          <p:cNvPr id="76" name="" descr=""/>
+          <p:cNvPicPr/>
+          <p:nvPr/>
+        </p:nvPicPr>
+        <p:blipFill>
+          <a:blip r:embed="rId1"/>
+          <a:stretch/>
+        </p:blipFill>
+        <p:spPr>
+          <a:xfrm>
+            <a:off x="2269080" y="1283760"/>
+            <a:ext cx="4680360" cy="4857480"/>
+          </a:xfrm>
+          <a:prstGeom prst="rect">
+            <a:avLst/>
+          </a:prstGeom>
+          <a:ln>
+            <a:noFill/>
+          </a:ln>
+        </p:spPr>
+      </p:pic>
+    </p:spTree>
+  </p:cSld>
+  <p:timing>
+    <p:tnLst>
+      <p:par>
+        <p:cTn id="3" dur="indefinite" restart="never" nodeType="tmRoot">
+          <p:childTnLst>
+            <p:seq>
+              <p:cTn id="4" nodeType="mainSeq"/>
               <p:prevCondLst>
                 <p:cond delay="0" evt="onPrev">
                   <p:tgtEl>

</xml_diff>